<commit_message>
Bài 4: Hình lặp quanh tâm
</commit_message>
<xml_diff>
--- a/Bài 4 - Vẽ hình lặp quanh tâm/Bài 4.pptx
+++ b/Bài 4 - Vẽ hình lặp quanh tâm/Bài 4.pptx
@@ -6,14 +6,13 @@
   </p:sldMasterIdLst>
   <p:sldIdLst>
     <p:sldId id="256" r:id="rId2"/>
-    <p:sldId id="257" r:id="rId3"/>
-    <p:sldId id="258" r:id="rId4"/>
-    <p:sldId id="261" r:id="rId5"/>
-    <p:sldId id="259" r:id="rId6"/>
-    <p:sldId id="262" r:id="rId7"/>
-    <p:sldId id="260" r:id="rId8"/>
-    <p:sldId id="263" r:id="rId9"/>
-    <p:sldId id="264" r:id="rId10"/>
+    <p:sldId id="258" r:id="rId3"/>
+    <p:sldId id="261" r:id="rId4"/>
+    <p:sldId id="259" r:id="rId5"/>
+    <p:sldId id="262" r:id="rId6"/>
+    <p:sldId id="260" r:id="rId7"/>
+    <p:sldId id="263" r:id="rId8"/>
+    <p:sldId id="264" r:id="rId9"/>
   </p:sldIdLst>
   <p:sldSz cx="12192000" cy="6858000"/>
   <p:notesSz cx="6858000" cy="9144000"/>
@@ -267,7 +266,7 @@
           <a:p>
             <a:fld id="{187CD168-B2F8-42EE-8F80-ECEFECFA70DF}" type="datetimeFigureOut">
               <a:rPr lang="en-US" smtClean="0"/>
-              <a:t>3/1/2023</a:t>
+              <a:t>3/9/2023</a:t>
             </a:fld>
             <a:endParaRPr lang="en-US"/>
           </a:p>
@@ -465,7 +464,7 @@
           <a:p>
             <a:fld id="{187CD168-B2F8-42EE-8F80-ECEFECFA70DF}" type="datetimeFigureOut">
               <a:rPr lang="en-US" smtClean="0"/>
-              <a:t>3/1/2023</a:t>
+              <a:t>3/9/2023</a:t>
             </a:fld>
             <a:endParaRPr lang="en-US"/>
           </a:p>
@@ -673,7 +672,7 @@
           <a:p>
             <a:fld id="{187CD168-B2F8-42EE-8F80-ECEFECFA70DF}" type="datetimeFigureOut">
               <a:rPr lang="en-US" smtClean="0"/>
-              <a:t>3/1/2023</a:t>
+              <a:t>3/9/2023</a:t>
             </a:fld>
             <a:endParaRPr lang="en-US"/>
           </a:p>
@@ -871,7 +870,7 @@
           <a:p>
             <a:fld id="{187CD168-B2F8-42EE-8F80-ECEFECFA70DF}" type="datetimeFigureOut">
               <a:rPr lang="en-US" smtClean="0"/>
-              <a:t>3/1/2023</a:t>
+              <a:t>3/9/2023</a:t>
             </a:fld>
             <a:endParaRPr lang="en-US"/>
           </a:p>
@@ -1146,7 +1145,7 @@
           <a:p>
             <a:fld id="{187CD168-B2F8-42EE-8F80-ECEFECFA70DF}" type="datetimeFigureOut">
               <a:rPr lang="en-US" smtClean="0"/>
-              <a:t>3/1/2023</a:t>
+              <a:t>3/9/2023</a:t>
             </a:fld>
             <a:endParaRPr lang="en-US"/>
           </a:p>
@@ -1411,7 +1410,7 @@
           <a:p>
             <a:fld id="{187CD168-B2F8-42EE-8F80-ECEFECFA70DF}" type="datetimeFigureOut">
               <a:rPr lang="en-US" smtClean="0"/>
-              <a:t>3/1/2023</a:t>
+              <a:t>3/9/2023</a:t>
             </a:fld>
             <a:endParaRPr lang="en-US"/>
           </a:p>
@@ -1823,7 +1822,7 @@
           <a:p>
             <a:fld id="{187CD168-B2F8-42EE-8F80-ECEFECFA70DF}" type="datetimeFigureOut">
               <a:rPr lang="en-US" smtClean="0"/>
-              <a:t>3/1/2023</a:t>
+              <a:t>3/9/2023</a:t>
             </a:fld>
             <a:endParaRPr lang="en-US"/>
           </a:p>
@@ -1964,7 +1963,7 @@
           <a:p>
             <a:fld id="{187CD168-B2F8-42EE-8F80-ECEFECFA70DF}" type="datetimeFigureOut">
               <a:rPr lang="en-US" smtClean="0"/>
-              <a:t>3/1/2023</a:t>
+              <a:t>3/9/2023</a:t>
             </a:fld>
             <a:endParaRPr lang="en-US"/>
           </a:p>
@@ -2077,7 +2076,7 @@
           <a:p>
             <a:fld id="{187CD168-B2F8-42EE-8F80-ECEFECFA70DF}" type="datetimeFigureOut">
               <a:rPr lang="en-US" smtClean="0"/>
-              <a:t>3/1/2023</a:t>
+              <a:t>3/9/2023</a:t>
             </a:fld>
             <a:endParaRPr lang="en-US"/>
           </a:p>
@@ -2388,7 +2387,7 @@
           <a:p>
             <a:fld id="{187CD168-B2F8-42EE-8F80-ECEFECFA70DF}" type="datetimeFigureOut">
               <a:rPr lang="en-US" smtClean="0"/>
-              <a:t>3/1/2023</a:t>
+              <a:t>3/9/2023</a:t>
             </a:fld>
             <a:endParaRPr lang="en-US"/>
           </a:p>
@@ -2676,7 +2675,7 @@
           <a:p>
             <a:fld id="{187CD168-B2F8-42EE-8F80-ECEFECFA70DF}" type="datetimeFigureOut">
               <a:rPr lang="en-US" smtClean="0"/>
-              <a:t>3/1/2023</a:t>
+              <a:t>3/9/2023</a:t>
             </a:fld>
             <a:endParaRPr lang="en-US"/>
           </a:p>
@@ -2917,7 +2916,7 @@
           <a:p>
             <a:fld id="{187CD168-B2F8-42EE-8F80-ECEFECFA70DF}" type="datetimeFigureOut">
               <a:rPr lang="en-US" smtClean="0"/>
-              <a:t>3/1/2023</a:t>
+              <a:t>3/9/2023</a:t>
             </a:fld>
             <a:endParaRPr lang="en-US"/>
           </a:p>
@@ -3425,7 +3424,7 @@
           <p:cNvPr id="2" name="Title 1">
             <a:extLst>
               <a:ext uri="{FF2B5EF4-FFF2-40B4-BE49-F238E27FC236}">
-                <a16:creationId xmlns:a16="http://schemas.microsoft.com/office/drawing/2014/main" id="{CABEEFCE-8663-D112-8133-F092B762C550}"/>
+                <a16:creationId xmlns:a16="http://schemas.microsoft.com/office/drawing/2014/main" id="{139F141B-1018-A890-EFC6-C74B75EF5AA4}"/>
               </a:ext>
             </a:extLst>
           </p:cNvPr>
@@ -3443,7 +3442,102 @@
           <a:p>
             <a:r>
               <a:rPr lang="en-US"/>
-              <a:t>Ví dụ:</a:t>
+              <a:t>Hình cơ sở là hình tam giác đều</a:t>
+            </a:r>
+          </a:p>
+        </p:txBody>
+      </p:sp>
+      <p:pic>
+        <p:nvPicPr>
+          <p:cNvPr id="4" name="Picture 3">
+            <a:extLst>
+              <a:ext uri="{FF2B5EF4-FFF2-40B4-BE49-F238E27FC236}">
+                <a16:creationId xmlns:a16="http://schemas.microsoft.com/office/drawing/2014/main" id="{14DE2EF2-2FB4-D624-FFA0-0EB33B733E35}"/>
+              </a:ext>
+            </a:extLst>
+          </p:cNvPr>
+          <p:cNvPicPr>
+            <a:picLocks noChangeAspect="1"/>
+          </p:cNvPicPr>
+          <p:nvPr/>
+        </p:nvPicPr>
+        <p:blipFill>
+          <a:blip r:embed="rId2"/>
+          <a:stretch>
+            <a:fillRect/>
+          </a:stretch>
+        </p:blipFill>
+        <p:spPr>
+          <a:xfrm>
+            <a:off x="838200" y="2337990"/>
+            <a:ext cx="3871452" cy="3203091"/>
+          </a:xfrm>
+          <a:prstGeom prst="rect">
+            <a:avLst/>
+          </a:prstGeom>
+        </p:spPr>
+      </p:pic>
+      <p:pic>
+        <p:nvPicPr>
+          <p:cNvPr id="6" name="Picture 5">
+            <a:extLst>
+              <a:ext uri="{FF2B5EF4-FFF2-40B4-BE49-F238E27FC236}">
+                <a16:creationId xmlns:a16="http://schemas.microsoft.com/office/drawing/2014/main" id="{00A612AB-DDF0-83A8-CCBD-57E8CB4A99CD}"/>
+              </a:ext>
+            </a:extLst>
+          </p:cNvPr>
+          <p:cNvPicPr>
+            <a:picLocks noChangeAspect="1"/>
+          </p:cNvPicPr>
+          <p:nvPr/>
+        </p:nvPicPr>
+        <p:blipFill>
+          <a:blip r:embed="rId3"/>
+          <a:stretch>
+            <a:fillRect/>
+          </a:stretch>
+        </p:blipFill>
+        <p:spPr>
+          <a:xfrm>
+            <a:off x="5377016" y="1345255"/>
+            <a:ext cx="5507294" cy="5463585"/>
+          </a:xfrm>
+          <a:prstGeom prst="rect">
+            <a:avLst/>
+          </a:prstGeom>
+        </p:spPr>
+      </p:pic>
+      <p:sp>
+        <p:nvSpPr>
+          <p:cNvPr id="7" name="TextBox 6">
+            <a:extLst>
+              <a:ext uri="{FF2B5EF4-FFF2-40B4-BE49-F238E27FC236}">
+                <a16:creationId xmlns:a16="http://schemas.microsoft.com/office/drawing/2014/main" id="{9CBF20A5-75B5-9250-4B6C-45DB0FD11BCA}"/>
+              </a:ext>
+            </a:extLst>
+          </p:cNvPr>
+          <p:cNvSpPr txBox="1"/>
+          <p:nvPr/>
+        </p:nvSpPr>
+        <p:spPr>
+          <a:xfrm>
+            <a:off x="1809135" y="6115665"/>
+            <a:ext cx="671979" cy="369332"/>
+          </a:xfrm>
+          <a:prstGeom prst="rect">
+            <a:avLst/>
+          </a:prstGeom>
+          <a:noFill/>
+        </p:spPr>
+        <p:txBody>
+          <a:bodyPr wrap="none" rtlCol="0">
+            <a:spAutoFit/>
+          </a:bodyPr>
+          <a:lstStyle/>
+          <a:p>
+            <a:r>
+              <a:rPr lang="en-US"/>
+              <a:t>N = 3</a:t>
             </a:r>
           </a:p>
         </p:txBody>
@@ -3451,7 +3545,7 @@
     </p:spTree>
     <p:extLst>
       <p:ext uri="{BB962C8B-B14F-4D97-AF65-F5344CB8AC3E}">
-        <p14:creationId xmlns:p14="http://schemas.microsoft.com/office/powerpoint/2010/main" val="52588571"/>
+        <p14:creationId xmlns:p14="http://schemas.microsoft.com/office/powerpoint/2010/main" val="4011825987"/>
       </p:ext>
     </p:extLst>
   </p:cSld>
@@ -3508,10 +3602,10 @@
       </p:sp>
       <p:pic>
         <p:nvPicPr>
-          <p:cNvPr id="4" name="Picture 3">
-            <a:extLst>
-              <a:ext uri="{FF2B5EF4-FFF2-40B4-BE49-F238E27FC236}">
-                <a16:creationId xmlns:a16="http://schemas.microsoft.com/office/drawing/2014/main" id="{14DE2EF2-2FB4-D624-FFA0-0EB33B733E35}"/>
+          <p:cNvPr id="5" name="Picture 4">
+            <a:extLst>
+              <a:ext uri="{FF2B5EF4-FFF2-40B4-BE49-F238E27FC236}">
+                <a16:creationId xmlns:a16="http://schemas.microsoft.com/office/drawing/2014/main" id="{0EA04EF6-55BC-2436-445C-B1C808EB9648}"/>
               </a:ext>
             </a:extLst>
           </p:cNvPr>
@@ -3528,8 +3622,8 @@
         </p:blipFill>
         <p:spPr>
           <a:xfrm>
-            <a:off x="838200" y="2337990"/>
-            <a:ext cx="3871452" cy="3203091"/>
+            <a:off x="1191392" y="1954621"/>
+            <a:ext cx="3457575" cy="2771775"/>
           </a:xfrm>
           <a:prstGeom prst="rect">
             <a:avLst/>
@@ -3538,10 +3632,10 @@
       </p:pic>
       <p:pic>
         <p:nvPicPr>
-          <p:cNvPr id="6" name="Picture 5">
-            <a:extLst>
-              <a:ext uri="{FF2B5EF4-FFF2-40B4-BE49-F238E27FC236}">
-                <a16:creationId xmlns:a16="http://schemas.microsoft.com/office/drawing/2014/main" id="{00A612AB-DDF0-83A8-CCBD-57E8CB4A99CD}"/>
+          <p:cNvPr id="8" name="Picture 7">
+            <a:extLst>
+              <a:ext uri="{FF2B5EF4-FFF2-40B4-BE49-F238E27FC236}">
+                <a16:creationId xmlns:a16="http://schemas.microsoft.com/office/drawing/2014/main" id="{93ECF5C5-5E80-101D-1307-2E11FACC0336}"/>
               </a:ext>
             </a:extLst>
           </p:cNvPr>
@@ -3558,20 +3652,50 @@
         </p:blipFill>
         <p:spPr>
           <a:xfrm>
-            <a:off x="5377016" y="1345255"/>
-            <a:ext cx="5507294" cy="5463585"/>
+            <a:off x="4548187" y="1954620"/>
+            <a:ext cx="3095625" cy="2771775"/>
           </a:xfrm>
           <a:prstGeom prst="rect">
             <a:avLst/>
           </a:prstGeom>
         </p:spPr>
       </p:pic>
-      <p:sp>
-        <p:nvSpPr>
-          <p:cNvPr id="7" name="TextBox 6">
-            <a:extLst>
-              <a:ext uri="{FF2B5EF4-FFF2-40B4-BE49-F238E27FC236}">
-                <a16:creationId xmlns:a16="http://schemas.microsoft.com/office/drawing/2014/main" id="{9CBF20A5-75B5-9250-4B6C-45DB0FD11BCA}"/>
+      <p:pic>
+        <p:nvPicPr>
+          <p:cNvPr id="10" name="Picture 9">
+            <a:extLst>
+              <a:ext uri="{FF2B5EF4-FFF2-40B4-BE49-F238E27FC236}">
+                <a16:creationId xmlns:a16="http://schemas.microsoft.com/office/drawing/2014/main" id="{3B6F3E1D-582C-A07B-260A-C39500358EA2}"/>
+              </a:ext>
+            </a:extLst>
+          </p:cNvPr>
+          <p:cNvPicPr>
+            <a:picLocks noChangeAspect="1"/>
+          </p:cNvPicPr>
+          <p:nvPr/>
+        </p:nvPicPr>
+        <p:blipFill>
+          <a:blip r:embed="rId4"/>
+          <a:stretch>
+            <a:fillRect/>
+          </a:stretch>
+        </p:blipFill>
+        <p:spPr>
+          <a:xfrm>
+            <a:off x="7643812" y="1954619"/>
+            <a:ext cx="3105150" cy="2819400"/>
+          </a:xfrm>
+          <a:prstGeom prst="rect">
+            <a:avLst/>
+          </a:prstGeom>
+        </p:spPr>
+      </p:pic>
+      <p:sp>
+        <p:nvSpPr>
+          <p:cNvPr id="11" name="TextBox 10">
+            <a:extLst>
+              <a:ext uri="{FF2B5EF4-FFF2-40B4-BE49-F238E27FC236}">
+                <a16:creationId xmlns:a16="http://schemas.microsoft.com/office/drawing/2014/main" id="{38B88397-4148-7150-1D9B-327FCEC77D90}"/>
               </a:ext>
             </a:extLst>
           </p:cNvPr>
@@ -3580,7 +3704,7 @@
         </p:nvSpPr>
         <p:spPr>
           <a:xfrm>
-            <a:off x="1809135" y="6115665"/>
+            <a:off x="2428567" y="5220930"/>
             <a:ext cx="671979" cy="369332"/>
           </a:xfrm>
           <a:prstGeom prst="rect">
@@ -3596,7 +3720,77 @@
           <a:p>
             <a:r>
               <a:rPr lang="en-US"/>
-              <a:t>N = 3</a:t>
+              <a:t>N = 4</a:t>
+            </a:r>
+          </a:p>
+        </p:txBody>
+      </p:sp>
+      <p:sp>
+        <p:nvSpPr>
+          <p:cNvPr id="12" name="TextBox 11">
+            <a:extLst>
+              <a:ext uri="{FF2B5EF4-FFF2-40B4-BE49-F238E27FC236}">
+                <a16:creationId xmlns:a16="http://schemas.microsoft.com/office/drawing/2014/main" id="{3C38E99E-8B3A-9717-6C61-8BE837B19691}"/>
+              </a:ext>
+            </a:extLst>
+          </p:cNvPr>
+          <p:cNvSpPr txBox="1"/>
+          <p:nvPr/>
+        </p:nvSpPr>
+        <p:spPr>
+          <a:xfrm>
+            <a:off x="5760009" y="5220930"/>
+            <a:ext cx="671979" cy="369332"/>
+          </a:xfrm>
+          <a:prstGeom prst="rect">
+            <a:avLst/>
+          </a:prstGeom>
+          <a:noFill/>
+        </p:spPr>
+        <p:txBody>
+          <a:bodyPr wrap="none" rtlCol="0">
+            <a:spAutoFit/>
+          </a:bodyPr>
+          <a:lstStyle/>
+          <a:p>
+            <a:r>
+              <a:rPr lang="en-US"/>
+              <a:t>N = 5</a:t>
+            </a:r>
+          </a:p>
+        </p:txBody>
+      </p:sp>
+      <p:sp>
+        <p:nvSpPr>
+          <p:cNvPr id="13" name="TextBox 12">
+            <a:extLst>
+              <a:ext uri="{FF2B5EF4-FFF2-40B4-BE49-F238E27FC236}">
+                <a16:creationId xmlns:a16="http://schemas.microsoft.com/office/drawing/2014/main" id="{9206CF17-B645-CD97-2284-BE5750531537}"/>
+              </a:ext>
+            </a:extLst>
+          </p:cNvPr>
+          <p:cNvSpPr txBox="1"/>
+          <p:nvPr/>
+        </p:nvSpPr>
+        <p:spPr>
+          <a:xfrm>
+            <a:off x="8860397" y="5220930"/>
+            <a:ext cx="671979" cy="369332"/>
+          </a:xfrm>
+          <a:prstGeom prst="rect">
+            <a:avLst/>
+          </a:prstGeom>
+          <a:noFill/>
+        </p:spPr>
+        <p:txBody>
+          <a:bodyPr wrap="none" rtlCol="0">
+            <a:spAutoFit/>
+          </a:bodyPr>
+          <a:lstStyle/>
+          <a:p>
+            <a:r>
+              <a:rPr lang="en-US"/>
+              <a:t>N = 7</a:t>
             </a:r>
           </a:p>
         </p:txBody>
@@ -3604,7 +3798,7 @@
     </p:spTree>
     <p:extLst>
       <p:ext uri="{BB962C8B-B14F-4D97-AF65-F5344CB8AC3E}">
-        <p14:creationId xmlns:p14="http://schemas.microsoft.com/office/powerpoint/2010/main" val="4011825987"/>
+        <p14:creationId xmlns:p14="http://schemas.microsoft.com/office/powerpoint/2010/main" val="2320909906"/>
       </p:ext>
     </p:extLst>
   </p:cSld>
@@ -3654,17 +3848,17 @@
           <a:p>
             <a:r>
               <a:rPr lang="en-US"/>
-              <a:t>Hình cơ sở là hình tam giác đều</a:t>
+              <a:t>Hình cơ sở là hình vuông</a:t>
             </a:r>
           </a:p>
         </p:txBody>
       </p:sp>
       <p:pic>
         <p:nvPicPr>
-          <p:cNvPr id="5" name="Picture 4">
-            <a:extLst>
-              <a:ext uri="{FF2B5EF4-FFF2-40B4-BE49-F238E27FC236}">
-                <a16:creationId xmlns:a16="http://schemas.microsoft.com/office/drawing/2014/main" id="{0EA04EF6-55BC-2436-445C-B1C808EB9648}"/>
+          <p:cNvPr id="4" name="Picture 3">
+            <a:extLst>
+              <a:ext uri="{FF2B5EF4-FFF2-40B4-BE49-F238E27FC236}">
+                <a16:creationId xmlns:a16="http://schemas.microsoft.com/office/drawing/2014/main" id="{AB90D3F7-D597-F689-C0F0-9751038927F7}"/>
               </a:ext>
             </a:extLst>
           </p:cNvPr>
@@ -3681,8 +3875,8 @@
         </p:blipFill>
         <p:spPr>
           <a:xfrm>
-            <a:off x="1191392" y="1954621"/>
-            <a:ext cx="3457575" cy="2771775"/>
+            <a:off x="1841091" y="2298443"/>
+            <a:ext cx="2857500" cy="2752725"/>
           </a:xfrm>
           <a:prstGeom prst="rect">
             <a:avLst/>
@@ -3691,10 +3885,10 @@
       </p:pic>
       <p:pic>
         <p:nvPicPr>
-          <p:cNvPr id="8" name="Picture 7">
-            <a:extLst>
-              <a:ext uri="{FF2B5EF4-FFF2-40B4-BE49-F238E27FC236}">
-                <a16:creationId xmlns:a16="http://schemas.microsoft.com/office/drawing/2014/main" id="{93ECF5C5-5E80-101D-1307-2E11FACC0336}"/>
+          <p:cNvPr id="6" name="Picture 5">
+            <a:extLst>
+              <a:ext uri="{FF2B5EF4-FFF2-40B4-BE49-F238E27FC236}">
+                <a16:creationId xmlns:a16="http://schemas.microsoft.com/office/drawing/2014/main" id="{2DD247CF-329C-6990-975E-A8100DF273D0}"/>
               </a:ext>
             </a:extLst>
           </p:cNvPr>
@@ -3711,153 +3905,18 @@
         </p:blipFill>
         <p:spPr>
           <a:xfrm>
-            <a:off x="4548187" y="1954620"/>
-            <a:ext cx="3095625" cy="2771775"/>
+            <a:off x="5104632" y="1301750"/>
+            <a:ext cx="4676775" cy="5191125"/>
           </a:xfrm>
           <a:prstGeom prst="rect">
             <a:avLst/>
           </a:prstGeom>
         </p:spPr>
       </p:pic>
-      <p:pic>
-        <p:nvPicPr>
-          <p:cNvPr id="10" name="Picture 9">
-            <a:extLst>
-              <a:ext uri="{FF2B5EF4-FFF2-40B4-BE49-F238E27FC236}">
-                <a16:creationId xmlns:a16="http://schemas.microsoft.com/office/drawing/2014/main" id="{3B6F3E1D-582C-A07B-260A-C39500358EA2}"/>
-              </a:ext>
-            </a:extLst>
-          </p:cNvPr>
-          <p:cNvPicPr>
-            <a:picLocks noChangeAspect="1"/>
-          </p:cNvPicPr>
-          <p:nvPr/>
-        </p:nvPicPr>
-        <p:blipFill>
-          <a:blip r:embed="rId4"/>
-          <a:stretch>
-            <a:fillRect/>
-          </a:stretch>
-        </p:blipFill>
-        <p:spPr>
-          <a:xfrm>
-            <a:off x="7643812" y="1954619"/>
-            <a:ext cx="3105150" cy="2819400"/>
-          </a:xfrm>
-          <a:prstGeom prst="rect">
-            <a:avLst/>
-          </a:prstGeom>
-        </p:spPr>
-      </p:pic>
-      <p:sp>
-        <p:nvSpPr>
-          <p:cNvPr id="11" name="TextBox 10">
-            <a:extLst>
-              <a:ext uri="{FF2B5EF4-FFF2-40B4-BE49-F238E27FC236}">
-                <a16:creationId xmlns:a16="http://schemas.microsoft.com/office/drawing/2014/main" id="{38B88397-4148-7150-1D9B-327FCEC77D90}"/>
-              </a:ext>
-            </a:extLst>
-          </p:cNvPr>
-          <p:cNvSpPr txBox="1"/>
-          <p:nvPr/>
-        </p:nvSpPr>
-        <p:spPr>
-          <a:xfrm>
-            <a:off x="2428567" y="5220930"/>
-            <a:ext cx="671979" cy="369332"/>
-          </a:xfrm>
-          <a:prstGeom prst="rect">
-            <a:avLst/>
-          </a:prstGeom>
-          <a:noFill/>
-        </p:spPr>
-        <p:txBody>
-          <a:bodyPr wrap="none" rtlCol="0">
-            <a:spAutoFit/>
-          </a:bodyPr>
-          <a:lstStyle/>
-          <a:p>
-            <a:r>
-              <a:rPr lang="en-US"/>
-              <a:t>N = 4</a:t>
-            </a:r>
-          </a:p>
-        </p:txBody>
-      </p:sp>
-      <p:sp>
-        <p:nvSpPr>
-          <p:cNvPr id="12" name="TextBox 11">
-            <a:extLst>
-              <a:ext uri="{FF2B5EF4-FFF2-40B4-BE49-F238E27FC236}">
-                <a16:creationId xmlns:a16="http://schemas.microsoft.com/office/drawing/2014/main" id="{3C38E99E-8B3A-9717-6C61-8BE837B19691}"/>
-              </a:ext>
-            </a:extLst>
-          </p:cNvPr>
-          <p:cNvSpPr txBox="1"/>
-          <p:nvPr/>
-        </p:nvSpPr>
-        <p:spPr>
-          <a:xfrm>
-            <a:off x="5760009" y="5220930"/>
-            <a:ext cx="671979" cy="369332"/>
-          </a:xfrm>
-          <a:prstGeom prst="rect">
-            <a:avLst/>
-          </a:prstGeom>
-          <a:noFill/>
-        </p:spPr>
-        <p:txBody>
-          <a:bodyPr wrap="none" rtlCol="0">
-            <a:spAutoFit/>
-          </a:bodyPr>
-          <a:lstStyle/>
-          <a:p>
-            <a:r>
-              <a:rPr lang="en-US"/>
-              <a:t>N = 5</a:t>
-            </a:r>
-          </a:p>
-        </p:txBody>
-      </p:sp>
-      <p:sp>
-        <p:nvSpPr>
-          <p:cNvPr id="13" name="TextBox 12">
-            <a:extLst>
-              <a:ext uri="{FF2B5EF4-FFF2-40B4-BE49-F238E27FC236}">
-                <a16:creationId xmlns:a16="http://schemas.microsoft.com/office/drawing/2014/main" id="{9206CF17-B645-CD97-2284-BE5750531537}"/>
-              </a:ext>
-            </a:extLst>
-          </p:cNvPr>
-          <p:cNvSpPr txBox="1"/>
-          <p:nvPr/>
-        </p:nvSpPr>
-        <p:spPr>
-          <a:xfrm>
-            <a:off x="8860397" y="5220930"/>
-            <a:ext cx="671979" cy="369332"/>
-          </a:xfrm>
-          <a:prstGeom prst="rect">
-            <a:avLst/>
-          </a:prstGeom>
-          <a:noFill/>
-        </p:spPr>
-        <p:txBody>
-          <a:bodyPr wrap="none" rtlCol="0">
-            <a:spAutoFit/>
-          </a:bodyPr>
-          <a:lstStyle/>
-          <a:p>
-            <a:r>
-              <a:rPr lang="en-US"/>
-              <a:t>N = 7</a:t>
-            </a:r>
-          </a:p>
-        </p:txBody>
-      </p:sp>
     </p:spTree>
     <p:extLst>
       <p:ext uri="{BB962C8B-B14F-4D97-AF65-F5344CB8AC3E}">
-        <p14:creationId xmlns:p14="http://schemas.microsoft.com/office/powerpoint/2010/main" val="2320909906"/>
+        <p14:creationId xmlns:p14="http://schemas.microsoft.com/office/powerpoint/2010/main" val="3770711898"/>
       </p:ext>
     </p:extLst>
   </p:cSld>
@@ -3914,10 +3973,10 @@
       </p:sp>
       <p:pic>
         <p:nvPicPr>
-          <p:cNvPr id="4" name="Picture 3">
-            <a:extLst>
-              <a:ext uri="{FF2B5EF4-FFF2-40B4-BE49-F238E27FC236}">
-                <a16:creationId xmlns:a16="http://schemas.microsoft.com/office/drawing/2014/main" id="{AB90D3F7-D597-F689-C0F0-9751038927F7}"/>
+          <p:cNvPr id="5" name="Picture 4">
+            <a:extLst>
+              <a:ext uri="{FF2B5EF4-FFF2-40B4-BE49-F238E27FC236}">
+                <a16:creationId xmlns:a16="http://schemas.microsoft.com/office/drawing/2014/main" id="{5C9FFAED-10A1-650B-E603-069A5B73081E}"/>
               </a:ext>
             </a:extLst>
           </p:cNvPr>
@@ -3934,8 +3993,8 @@
         </p:blipFill>
         <p:spPr>
           <a:xfrm>
-            <a:off x="1841091" y="2298443"/>
-            <a:ext cx="2857500" cy="2752725"/>
+            <a:off x="838200" y="1949859"/>
+            <a:ext cx="3695700" cy="3390900"/>
           </a:xfrm>
           <a:prstGeom prst="rect">
             <a:avLst/>
@@ -3944,10 +4003,10 @@
       </p:pic>
       <p:pic>
         <p:nvPicPr>
-          <p:cNvPr id="6" name="Picture 5">
-            <a:extLst>
-              <a:ext uri="{FF2B5EF4-FFF2-40B4-BE49-F238E27FC236}">
-                <a16:creationId xmlns:a16="http://schemas.microsoft.com/office/drawing/2014/main" id="{2DD247CF-329C-6990-975E-A8100DF273D0}"/>
+          <p:cNvPr id="8" name="Picture 7">
+            <a:extLst>
+              <a:ext uri="{FF2B5EF4-FFF2-40B4-BE49-F238E27FC236}">
+                <a16:creationId xmlns:a16="http://schemas.microsoft.com/office/drawing/2014/main" id="{8B17AA43-944B-8828-B782-A3C568FA491D}"/>
               </a:ext>
             </a:extLst>
           </p:cNvPr>
@@ -3964,18 +4023,88 @@
         </p:blipFill>
         <p:spPr>
           <a:xfrm>
-            <a:off x="5104632" y="1301750"/>
-            <a:ext cx="4676775" cy="5191125"/>
+            <a:off x="6096000" y="1949859"/>
+            <a:ext cx="3638550" cy="3562350"/>
           </a:xfrm>
           <a:prstGeom prst="rect">
             <a:avLst/>
           </a:prstGeom>
         </p:spPr>
       </p:pic>
+      <p:sp>
+        <p:nvSpPr>
+          <p:cNvPr id="9" name="TextBox 8">
+            <a:extLst>
+              <a:ext uri="{FF2B5EF4-FFF2-40B4-BE49-F238E27FC236}">
+                <a16:creationId xmlns:a16="http://schemas.microsoft.com/office/drawing/2014/main" id="{6F69FFB1-C464-2096-80E4-B60388AB8015}"/>
+              </a:ext>
+            </a:extLst>
+          </p:cNvPr>
+          <p:cNvSpPr txBox="1"/>
+          <p:nvPr/>
+        </p:nvSpPr>
+        <p:spPr>
+          <a:xfrm>
+            <a:off x="2350060" y="5690109"/>
+            <a:ext cx="671979" cy="369332"/>
+          </a:xfrm>
+          <a:prstGeom prst="rect">
+            <a:avLst/>
+          </a:prstGeom>
+          <a:noFill/>
+        </p:spPr>
+        <p:txBody>
+          <a:bodyPr wrap="none" rtlCol="0">
+            <a:spAutoFit/>
+          </a:bodyPr>
+          <a:lstStyle/>
+          <a:p>
+            <a:r>
+              <a:rPr lang="en-US"/>
+              <a:t>N = 5</a:t>
+            </a:r>
+          </a:p>
+        </p:txBody>
+      </p:sp>
+      <p:sp>
+        <p:nvSpPr>
+          <p:cNvPr id="10" name="TextBox 9">
+            <a:extLst>
+              <a:ext uri="{FF2B5EF4-FFF2-40B4-BE49-F238E27FC236}">
+                <a16:creationId xmlns:a16="http://schemas.microsoft.com/office/drawing/2014/main" id="{A1952E9A-9016-896B-9338-BF057B002F4E}"/>
+              </a:ext>
+            </a:extLst>
+          </p:cNvPr>
+          <p:cNvSpPr txBox="1"/>
+          <p:nvPr/>
+        </p:nvSpPr>
+        <p:spPr>
+          <a:xfrm>
+            <a:off x="7579285" y="5874775"/>
+            <a:ext cx="788999" cy="369332"/>
+          </a:xfrm>
+          <a:prstGeom prst="rect">
+            <a:avLst/>
+          </a:prstGeom>
+          <a:noFill/>
+        </p:spPr>
+        <p:txBody>
+          <a:bodyPr wrap="none" rtlCol="0">
+            <a:spAutoFit/>
+          </a:bodyPr>
+          <a:lstStyle/>
+          <a:p>
+            <a:r>
+              <a:rPr lang="en-US"/>
+              <a:t>N = 12</a:t>
+            </a:r>
+          </a:p>
+        </p:txBody>
+      </p:sp>
     </p:spTree>
     <p:extLst>
       <p:ext uri="{BB962C8B-B14F-4D97-AF65-F5344CB8AC3E}">
-        <p14:creationId xmlns:p14="http://schemas.microsoft.com/office/powerpoint/2010/main" val="3770711898"/>
+        <p14:creationId xmlns:p14="http://schemas.microsoft.com/office/powerpoint/2010/main" val="1156709301"/>
       </p:ext>
     </p:extLst>
   </p:cSld>
@@ -4025,17 +4154,17 @@
           <a:p>
             <a:r>
               <a:rPr lang="en-US"/>
-              <a:t>Hình cơ sở là hình vuông</a:t>
+              <a:t>Hình cơ sở là hình ngũ giác đều</a:t>
             </a:r>
           </a:p>
         </p:txBody>
       </p:sp>
       <p:pic>
         <p:nvPicPr>
-          <p:cNvPr id="5" name="Picture 4">
-            <a:extLst>
-              <a:ext uri="{FF2B5EF4-FFF2-40B4-BE49-F238E27FC236}">
-                <a16:creationId xmlns:a16="http://schemas.microsoft.com/office/drawing/2014/main" id="{5C9FFAED-10A1-650B-E603-069A5B73081E}"/>
+          <p:cNvPr id="4" name="Picture 3">
+            <a:extLst>
+              <a:ext uri="{FF2B5EF4-FFF2-40B4-BE49-F238E27FC236}">
+                <a16:creationId xmlns:a16="http://schemas.microsoft.com/office/drawing/2014/main" id="{B681D0E5-F89B-7E42-F3D0-7041DA445795}"/>
               </a:ext>
             </a:extLst>
           </p:cNvPr>
@@ -4052,8 +4181,8 @@
         </p:blipFill>
         <p:spPr>
           <a:xfrm>
-            <a:off x="838200" y="1949859"/>
-            <a:ext cx="3695700" cy="3390900"/>
+            <a:off x="960796" y="2127453"/>
+            <a:ext cx="2981940" cy="2906765"/>
           </a:xfrm>
           <a:prstGeom prst="rect">
             <a:avLst/>
@@ -4062,10 +4191,10 @@
       </p:pic>
       <p:pic>
         <p:nvPicPr>
-          <p:cNvPr id="8" name="Picture 7">
-            <a:extLst>
-              <a:ext uri="{FF2B5EF4-FFF2-40B4-BE49-F238E27FC236}">
-                <a16:creationId xmlns:a16="http://schemas.microsoft.com/office/drawing/2014/main" id="{8B17AA43-944B-8828-B782-A3C568FA491D}"/>
+          <p:cNvPr id="6" name="Picture 5">
+            <a:extLst>
+              <a:ext uri="{FF2B5EF4-FFF2-40B4-BE49-F238E27FC236}">
+                <a16:creationId xmlns:a16="http://schemas.microsoft.com/office/drawing/2014/main" id="{F90F5D33-FCD0-CE89-8E64-AD79D916C687}"/>
               </a:ext>
             </a:extLst>
           </p:cNvPr>
@@ -4082,88 +4211,18 @@
         </p:blipFill>
         <p:spPr>
           <a:xfrm>
-            <a:off x="6096000" y="1949859"/>
-            <a:ext cx="3638550" cy="3562350"/>
+            <a:off x="5201265" y="1395719"/>
+            <a:ext cx="5048250" cy="5305425"/>
           </a:xfrm>
           <a:prstGeom prst="rect">
             <a:avLst/>
           </a:prstGeom>
         </p:spPr>
       </p:pic>
-      <p:sp>
-        <p:nvSpPr>
-          <p:cNvPr id="9" name="TextBox 8">
-            <a:extLst>
-              <a:ext uri="{FF2B5EF4-FFF2-40B4-BE49-F238E27FC236}">
-                <a16:creationId xmlns:a16="http://schemas.microsoft.com/office/drawing/2014/main" id="{6F69FFB1-C464-2096-80E4-B60388AB8015}"/>
-              </a:ext>
-            </a:extLst>
-          </p:cNvPr>
-          <p:cNvSpPr txBox="1"/>
-          <p:nvPr/>
-        </p:nvSpPr>
-        <p:spPr>
-          <a:xfrm>
-            <a:off x="2350060" y="5690109"/>
-            <a:ext cx="671979" cy="369332"/>
-          </a:xfrm>
-          <a:prstGeom prst="rect">
-            <a:avLst/>
-          </a:prstGeom>
-          <a:noFill/>
-        </p:spPr>
-        <p:txBody>
-          <a:bodyPr wrap="none" rtlCol="0">
-            <a:spAutoFit/>
-          </a:bodyPr>
-          <a:lstStyle/>
-          <a:p>
-            <a:r>
-              <a:rPr lang="en-US"/>
-              <a:t>N = 5</a:t>
-            </a:r>
-          </a:p>
-        </p:txBody>
-      </p:sp>
-      <p:sp>
-        <p:nvSpPr>
-          <p:cNvPr id="10" name="TextBox 9">
-            <a:extLst>
-              <a:ext uri="{FF2B5EF4-FFF2-40B4-BE49-F238E27FC236}">
-                <a16:creationId xmlns:a16="http://schemas.microsoft.com/office/drawing/2014/main" id="{A1952E9A-9016-896B-9338-BF057B002F4E}"/>
-              </a:ext>
-            </a:extLst>
-          </p:cNvPr>
-          <p:cNvSpPr txBox="1"/>
-          <p:nvPr/>
-        </p:nvSpPr>
-        <p:spPr>
-          <a:xfrm>
-            <a:off x="7579285" y="5874775"/>
-            <a:ext cx="788999" cy="369332"/>
-          </a:xfrm>
-          <a:prstGeom prst="rect">
-            <a:avLst/>
-          </a:prstGeom>
-          <a:noFill/>
-        </p:spPr>
-        <p:txBody>
-          <a:bodyPr wrap="none" rtlCol="0">
-            <a:spAutoFit/>
-          </a:bodyPr>
-          <a:lstStyle/>
-          <a:p>
-            <a:r>
-              <a:rPr lang="en-US"/>
-              <a:t>N = 12</a:t>
-            </a:r>
-          </a:p>
-        </p:txBody>
-      </p:sp>
     </p:spTree>
     <p:extLst>
       <p:ext uri="{BB962C8B-B14F-4D97-AF65-F5344CB8AC3E}">
-        <p14:creationId xmlns:p14="http://schemas.microsoft.com/office/powerpoint/2010/main" val="1156709301"/>
+        <p14:creationId xmlns:p14="http://schemas.microsoft.com/office/powerpoint/2010/main" val="2074525258"/>
       </p:ext>
     </p:extLst>
   </p:cSld>
@@ -4220,10 +4279,10 @@
       </p:sp>
       <p:pic>
         <p:nvPicPr>
-          <p:cNvPr id="4" name="Picture 3">
-            <a:extLst>
-              <a:ext uri="{FF2B5EF4-FFF2-40B4-BE49-F238E27FC236}">
-                <a16:creationId xmlns:a16="http://schemas.microsoft.com/office/drawing/2014/main" id="{B681D0E5-F89B-7E42-F3D0-7041DA445795}"/>
+          <p:cNvPr id="5" name="Picture 4">
+            <a:extLst>
+              <a:ext uri="{FF2B5EF4-FFF2-40B4-BE49-F238E27FC236}">
+                <a16:creationId xmlns:a16="http://schemas.microsoft.com/office/drawing/2014/main" id="{FE0907D9-D6D2-1DAA-583E-7AD0A935CFDF}"/>
               </a:ext>
             </a:extLst>
           </p:cNvPr>
@@ -4240,8 +4299,8 @@
         </p:blipFill>
         <p:spPr>
           <a:xfrm>
-            <a:off x="960796" y="2127453"/>
-            <a:ext cx="2981940" cy="2906765"/>
+            <a:off x="1544279" y="2041423"/>
+            <a:ext cx="3086100" cy="2971800"/>
           </a:xfrm>
           <a:prstGeom prst="rect">
             <a:avLst/>
@@ -4250,10 +4309,10 @@
       </p:pic>
       <p:pic>
         <p:nvPicPr>
-          <p:cNvPr id="6" name="Picture 5">
-            <a:extLst>
-              <a:ext uri="{FF2B5EF4-FFF2-40B4-BE49-F238E27FC236}">
-                <a16:creationId xmlns:a16="http://schemas.microsoft.com/office/drawing/2014/main" id="{F90F5D33-FCD0-CE89-8E64-AD79D916C687}"/>
+          <p:cNvPr id="8" name="Picture 7">
+            <a:extLst>
+              <a:ext uri="{FF2B5EF4-FFF2-40B4-BE49-F238E27FC236}">
+                <a16:creationId xmlns:a16="http://schemas.microsoft.com/office/drawing/2014/main" id="{F2A53EA9-9937-2586-467C-A398655D951D}"/>
               </a:ext>
             </a:extLst>
           </p:cNvPr>
@@ -4270,18 +4329,88 @@
         </p:blipFill>
         <p:spPr>
           <a:xfrm>
-            <a:off x="5201265" y="1395719"/>
-            <a:ext cx="5048250" cy="5305425"/>
+            <a:off x="6096000" y="1371600"/>
+            <a:ext cx="4210050" cy="4114800"/>
           </a:xfrm>
           <a:prstGeom prst="rect">
             <a:avLst/>
           </a:prstGeom>
         </p:spPr>
       </p:pic>
+      <p:sp>
+        <p:nvSpPr>
+          <p:cNvPr id="9" name="TextBox 8">
+            <a:extLst>
+              <a:ext uri="{FF2B5EF4-FFF2-40B4-BE49-F238E27FC236}">
+                <a16:creationId xmlns:a16="http://schemas.microsoft.com/office/drawing/2014/main" id="{3B19C3E0-FC9A-0E17-548B-928BFC2CEB43}"/>
+              </a:ext>
+            </a:extLst>
+          </p:cNvPr>
+          <p:cNvSpPr txBox="1"/>
+          <p:nvPr/>
+        </p:nvSpPr>
+        <p:spPr>
+          <a:xfrm>
+            <a:off x="2350060" y="5690109"/>
+            <a:ext cx="788999" cy="369332"/>
+          </a:xfrm>
+          <a:prstGeom prst="rect">
+            <a:avLst/>
+          </a:prstGeom>
+          <a:noFill/>
+        </p:spPr>
+        <p:txBody>
+          <a:bodyPr wrap="none" rtlCol="0">
+            <a:spAutoFit/>
+          </a:bodyPr>
+          <a:lstStyle/>
+          <a:p>
+            <a:r>
+              <a:rPr lang="en-US"/>
+              <a:t>N = 12</a:t>
+            </a:r>
+          </a:p>
+        </p:txBody>
+      </p:sp>
+      <p:sp>
+        <p:nvSpPr>
+          <p:cNvPr id="10" name="TextBox 9">
+            <a:extLst>
+              <a:ext uri="{FF2B5EF4-FFF2-40B4-BE49-F238E27FC236}">
+                <a16:creationId xmlns:a16="http://schemas.microsoft.com/office/drawing/2014/main" id="{4E34DE56-C049-A93D-376A-AFC3340B7A9C}"/>
+              </a:ext>
+            </a:extLst>
+          </p:cNvPr>
+          <p:cNvSpPr txBox="1"/>
+          <p:nvPr/>
+        </p:nvSpPr>
+        <p:spPr>
+          <a:xfrm>
+            <a:off x="7865035" y="5690109"/>
+            <a:ext cx="788999" cy="369332"/>
+          </a:xfrm>
+          <a:prstGeom prst="rect">
+            <a:avLst/>
+          </a:prstGeom>
+          <a:noFill/>
+        </p:spPr>
+        <p:txBody>
+          <a:bodyPr wrap="none" rtlCol="0">
+            <a:spAutoFit/>
+          </a:bodyPr>
+          <a:lstStyle/>
+          <a:p>
+            <a:r>
+              <a:rPr lang="en-US"/>
+              <a:t>N = 36</a:t>
+            </a:r>
+          </a:p>
+        </p:txBody>
+      </p:sp>
     </p:spTree>
     <p:extLst>
       <p:ext uri="{BB962C8B-B14F-4D97-AF65-F5344CB8AC3E}">
-        <p14:creationId xmlns:p14="http://schemas.microsoft.com/office/powerpoint/2010/main" val="2074525258"/>
+        <p14:creationId xmlns:p14="http://schemas.microsoft.com/office/powerpoint/2010/main" val="4215003124"/>
       </p:ext>
     </p:extLst>
   </p:cSld>
@@ -4331,17 +4460,87 @@
           <a:p>
             <a:r>
               <a:rPr lang="en-US"/>
-              <a:t>Hình cơ sở là hình ngũ giác đều</a:t>
+              <a:t>Bài tập tự làm</a:t>
+            </a:r>
+          </a:p>
+        </p:txBody>
+      </p:sp>
+      <p:sp>
+        <p:nvSpPr>
+          <p:cNvPr id="9" name="TextBox 8">
+            <a:extLst>
+              <a:ext uri="{FF2B5EF4-FFF2-40B4-BE49-F238E27FC236}">
+                <a16:creationId xmlns:a16="http://schemas.microsoft.com/office/drawing/2014/main" id="{3B19C3E0-FC9A-0E17-548B-928BFC2CEB43}"/>
+              </a:ext>
+            </a:extLst>
+          </p:cNvPr>
+          <p:cNvSpPr txBox="1"/>
+          <p:nvPr/>
+        </p:nvSpPr>
+        <p:spPr>
+          <a:xfrm>
+            <a:off x="1716872" y="5505443"/>
+            <a:ext cx="2055371" cy="369332"/>
+          </a:xfrm>
+          <a:prstGeom prst="rect">
+            <a:avLst/>
+          </a:prstGeom>
+          <a:noFill/>
+        </p:spPr>
+        <p:txBody>
+          <a:bodyPr wrap="none" rtlCol="0">
+            <a:spAutoFit/>
+          </a:bodyPr>
+          <a:lstStyle/>
+          <a:p>
+            <a:r>
+              <a:rPr lang="en-US"/>
+              <a:t>10 hình lục giác đều</a:t>
+            </a:r>
+          </a:p>
+        </p:txBody>
+      </p:sp>
+      <p:sp>
+        <p:nvSpPr>
+          <p:cNvPr id="10" name="TextBox 9">
+            <a:extLst>
+              <a:ext uri="{FF2B5EF4-FFF2-40B4-BE49-F238E27FC236}">
+                <a16:creationId xmlns:a16="http://schemas.microsoft.com/office/drawing/2014/main" id="{4E34DE56-C049-A93D-376A-AFC3340B7A9C}"/>
+              </a:ext>
+            </a:extLst>
+          </p:cNvPr>
+          <p:cNvSpPr txBox="1"/>
+          <p:nvPr/>
+        </p:nvSpPr>
+        <p:spPr>
+          <a:xfrm>
+            <a:off x="6753990" y="5313589"/>
+            <a:ext cx="1059906" cy="369332"/>
+          </a:xfrm>
+          <a:prstGeom prst="rect">
+            <a:avLst/>
+          </a:prstGeom>
+          <a:noFill/>
+        </p:spPr>
+        <p:txBody>
+          <a:bodyPr wrap="none" rtlCol="0">
+            <a:spAutoFit/>
+          </a:bodyPr>
+          <a:lstStyle/>
+          <a:p>
+            <a:r>
+              <a:rPr lang="en-US"/>
+              <a:t>Hình số 2</a:t>
             </a:r>
           </a:p>
         </p:txBody>
       </p:sp>
       <p:pic>
         <p:nvPicPr>
-          <p:cNvPr id="5" name="Picture 4">
-            <a:extLst>
-              <a:ext uri="{FF2B5EF4-FFF2-40B4-BE49-F238E27FC236}">
-                <a16:creationId xmlns:a16="http://schemas.microsoft.com/office/drawing/2014/main" id="{FE0907D9-D6D2-1DAA-583E-7AD0A935CFDF}"/>
+          <p:cNvPr id="4" name="Picture 3">
+            <a:extLst>
+              <a:ext uri="{FF2B5EF4-FFF2-40B4-BE49-F238E27FC236}">
+                <a16:creationId xmlns:a16="http://schemas.microsoft.com/office/drawing/2014/main" id="{782AC522-A757-5827-4750-0D5D46A90E11}"/>
               </a:ext>
             </a:extLst>
           </p:cNvPr>
@@ -4358,50 +4557,20 @@
         </p:blipFill>
         <p:spPr>
           <a:xfrm>
-            <a:off x="1544279" y="2041423"/>
-            <a:ext cx="3086100" cy="2971800"/>
+            <a:off x="1415819" y="2669022"/>
+            <a:ext cx="2657475" cy="2667000"/>
           </a:xfrm>
           <a:prstGeom prst="rect">
             <a:avLst/>
           </a:prstGeom>
         </p:spPr>
       </p:pic>
-      <p:pic>
-        <p:nvPicPr>
-          <p:cNvPr id="8" name="Picture 7">
-            <a:extLst>
-              <a:ext uri="{FF2B5EF4-FFF2-40B4-BE49-F238E27FC236}">
-                <a16:creationId xmlns:a16="http://schemas.microsoft.com/office/drawing/2014/main" id="{F2A53EA9-9937-2586-467C-A398655D951D}"/>
-              </a:ext>
-            </a:extLst>
-          </p:cNvPr>
-          <p:cNvPicPr>
-            <a:picLocks noChangeAspect="1"/>
-          </p:cNvPicPr>
-          <p:nvPr/>
-        </p:nvPicPr>
-        <p:blipFill>
-          <a:blip r:embed="rId3"/>
-          <a:stretch>
-            <a:fillRect/>
-          </a:stretch>
-        </p:blipFill>
-        <p:spPr>
-          <a:xfrm>
-            <a:off x="6096000" y="1371600"/>
-            <a:ext cx="4210050" cy="4114800"/>
-          </a:xfrm>
-          <a:prstGeom prst="rect">
-            <a:avLst/>
-          </a:prstGeom>
-        </p:spPr>
-      </p:pic>
-      <p:sp>
-        <p:nvSpPr>
-          <p:cNvPr id="9" name="TextBox 8">
-            <a:extLst>
-              <a:ext uri="{FF2B5EF4-FFF2-40B4-BE49-F238E27FC236}">
-                <a16:creationId xmlns:a16="http://schemas.microsoft.com/office/drawing/2014/main" id="{3B19C3E0-FC9A-0E17-548B-928BFC2CEB43}"/>
+      <p:sp>
+        <p:nvSpPr>
+          <p:cNvPr id="11" name="TextBox 10">
+            <a:extLst>
+              <a:ext uri="{FF2B5EF4-FFF2-40B4-BE49-F238E27FC236}">
+                <a16:creationId xmlns:a16="http://schemas.microsoft.com/office/drawing/2014/main" id="{AD9AC77E-7B01-C28A-FF10-3C5BCDCA6670}"/>
               </a:ext>
             </a:extLst>
           </p:cNvPr>
@@ -4410,8 +4579,8 @@
         </p:nvSpPr>
         <p:spPr>
           <a:xfrm>
-            <a:off x="2350060" y="5690109"/>
-            <a:ext cx="788999" cy="369332"/>
+            <a:off x="6096000" y="1090523"/>
+            <a:ext cx="5879690" cy="1200329"/>
           </a:xfrm>
           <a:prstGeom prst="rect">
             <a:avLst/>
@@ -4419,234 +4588,6 @@
           <a:noFill/>
         </p:spPr>
         <p:txBody>
-          <a:bodyPr wrap="none" rtlCol="0">
-            <a:spAutoFit/>
-          </a:bodyPr>
-          <a:lstStyle/>
-          <a:p>
-            <a:r>
-              <a:rPr lang="en-US"/>
-              <a:t>N = 12</a:t>
-            </a:r>
-          </a:p>
-        </p:txBody>
-      </p:sp>
-      <p:sp>
-        <p:nvSpPr>
-          <p:cNvPr id="10" name="TextBox 9">
-            <a:extLst>
-              <a:ext uri="{FF2B5EF4-FFF2-40B4-BE49-F238E27FC236}">
-                <a16:creationId xmlns:a16="http://schemas.microsoft.com/office/drawing/2014/main" id="{4E34DE56-C049-A93D-376A-AFC3340B7A9C}"/>
-              </a:ext>
-            </a:extLst>
-          </p:cNvPr>
-          <p:cNvSpPr txBox="1"/>
-          <p:nvPr/>
-        </p:nvSpPr>
-        <p:spPr>
-          <a:xfrm>
-            <a:off x="7865035" y="5690109"/>
-            <a:ext cx="788999" cy="369332"/>
-          </a:xfrm>
-          <a:prstGeom prst="rect">
-            <a:avLst/>
-          </a:prstGeom>
-          <a:noFill/>
-        </p:spPr>
-        <p:txBody>
-          <a:bodyPr wrap="none" rtlCol="0">
-            <a:spAutoFit/>
-          </a:bodyPr>
-          <a:lstStyle/>
-          <a:p>
-            <a:r>
-              <a:rPr lang="en-US"/>
-              <a:t>N = 36</a:t>
-            </a:r>
-          </a:p>
-        </p:txBody>
-      </p:sp>
-    </p:spTree>
-    <p:extLst>
-      <p:ext uri="{BB962C8B-B14F-4D97-AF65-F5344CB8AC3E}">
-        <p14:creationId xmlns:p14="http://schemas.microsoft.com/office/powerpoint/2010/main" val="4215003124"/>
-      </p:ext>
-    </p:extLst>
-  </p:cSld>
-  <p:clrMapOvr>
-    <a:masterClrMapping/>
-  </p:clrMapOvr>
-</p:sld>
-</file>
-
-<file path=ppt/slides/slide9.xml><?xml version="1.0" encoding="utf-8"?>
-<p:sld xmlns:a="http://schemas.openxmlformats.org/drawingml/2006/main" xmlns:r="http://schemas.openxmlformats.org/officeDocument/2006/relationships" xmlns:p="http://schemas.openxmlformats.org/presentationml/2006/main">
-  <p:cSld>
-    <p:spTree>
-      <p:nvGrpSpPr>
-        <p:cNvPr id="1" name=""/>
-        <p:cNvGrpSpPr/>
-        <p:nvPr/>
-      </p:nvGrpSpPr>
-      <p:grpSpPr>
-        <a:xfrm>
-          <a:off x="0" y="0"/>
-          <a:ext cx="0" cy="0"/>
-          <a:chOff x="0" y="0"/>
-          <a:chExt cx="0" cy="0"/>
-        </a:xfrm>
-      </p:grpSpPr>
-      <p:sp>
-        <p:nvSpPr>
-          <p:cNvPr id="2" name="Title 1">
-            <a:extLst>
-              <a:ext uri="{FF2B5EF4-FFF2-40B4-BE49-F238E27FC236}">
-                <a16:creationId xmlns:a16="http://schemas.microsoft.com/office/drawing/2014/main" id="{139F141B-1018-A890-EFC6-C74B75EF5AA4}"/>
-              </a:ext>
-            </a:extLst>
-          </p:cNvPr>
-          <p:cNvSpPr>
-            <a:spLocks noGrp="1"/>
-          </p:cNvSpPr>
-          <p:nvPr>
-            <p:ph type="title"/>
-          </p:nvPr>
-        </p:nvSpPr>
-        <p:spPr/>
-        <p:txBody>
-          <a:bodyPr/>
-          <a:lstStyle/>
-          <a:p>
-            <a:r>
-              <a:rPr lang="en-US"/>
-              <a:t>Bài tập tự làm</a:t>
-            </a:r>
-          </a:p>
-        </p:txBody>
-      </p:sp>
-      <p:sp>
-        <p:nvSpPr>
-          <p:cNvPr id="9" name="TextBox 8">
-            <a:extLst>
-              <a:ext uri="{FF2B5EF4-FFF2-40B4-BE49-F238E27FC236}">
-                <a16:creationId xmlns:a16="http://schemas.microsoft.com/office/drawing/2014/main" id="{3B19C3E0-FC9A-0E17-548B-928BFC2CEB43}"/>
-              </a:ext>
-            </a:extLst>
-          </p:cNvPr>
-          <p:cNvSpPr txBox="1"/>
-          <p:nvPr/>
-        </p:nvSpPr>
-        <p:spPr>
-          <a:xfrm>
-            <a:off x="1716872" y="5505443"/>
-            <a:ext cx="2055371" cy="369332"/>
-          </a:xfrm>
-          <a:prstGeom prst="rect">
-            <a:avLst/>
-          </a:prstGeom>
-          <a:noFill/>
-        </p:spPr>
-        <p:txBody>
-          <a:bodyPr wrap="none" rtlCol="0">
-            <a:spAutoFit/>
-          </a:bodyPr>
-          <a:lstStyle/>
-          <a:p>
-            <a:r>
-              <a:rPr lang="en-US"/>
-              <a:t>10 hình lục giác đều</a:t>
-            </a:r>
-          </a:p>
-        </p:txBody>
-      </p:sp>
-      <p:sp>
-        <p:nvSpPr>
-          <p:cNvPr id="10" name="TextBox 9">
-            <a:extLst>
-              <a:ext uri="{FF2B5EF4-FFF2-40B4-BE49-F238E27FC236}">
-                <a16:creationId xmlns:a16="http://schemas.microsoft.com/office/drawing/2014/main" id="{4E34DE56-C049-A93D-376A-AFC3340B7A9C}"/>
-              </a:ext>
-            </a:extLst>
-          </p:cNvPr>
-          <p:cNvSpPr txBox="1"/>
-          <p:nvPr/>
-        </p:nvSpPr>
-        <p:spPr>
-          <a:xfrm>
-            <a:off x="6753990" y="5313589"/>
-            <a:ext cx="1059906" cy="369332"/>
-          </a:xfrm>
-          <a:prstGeom prst="rect">
-            <a:avLst/>
-          </a:prstGeom>
-          <a:noFill/>
-        </p:spPr>
-        <p:txBody>
-          <a:bodyPr wrap="none" rtlCol="0">
-            <a:spAutoFit/>
-          </a:bodyPr>
-          <a:lstStyle/>
-          <a:p>
-            <a:r>
-              <a:rPr lang="en-US"/>
-              <a:t>Hình số 2</a:t>
-            </a:r>
-          </a:p>
-        </p:txBody>
-      </p:sp>
-      <p:pic>
-        <p:nvPicPr>
-          <p:cNvPr id="4" name="Picture 3">
-            <a:extLst>
-              <a:ext uri="{FF2B5EF4-FFF2-40B4-BE49-F238E27FC236}">
-                <a16:creationId xmlns:a16="http://schemas.microsoft.com/office/drawing/2014/main" id="{782AC522-A757-5827-4750-0D5D46A90E11}"/>
-              </a:ext>
-            </a:extLst>
-          </p:cNvPr>
-          <p:cNvPicPr>
-            <a:picLocks noChangeAspect="1"/>
-          </p:cNvPicPr>
-          <p:nvPr/>
-        </p:nvPicPr>
-        <p:blipFill>
-          <a:blip r:embed="rId2"/>
-          <a:stretch>
-            <a:fillRect/>
-          </a:stretch>
-        </p:blipFill>
-        <p:spPr>
-          <a:xfrm>
-            <a:off x="1415819" y="2669022"/>
-            <a:ext cx="2657475" cy="2667000"/>
-          </a:xfrm>
-          <a:prstGeom prst="rect">
-            <a:avLst/>
-          </a:prstGeom>
-        </p:spPr>
-      </p:pic>
-      <p:sp>
-        <p:nvSpPr>
-          <p:cNvPr id="11" name="TextBox 10">
-            <a:extLst>
-              <a:ext uri="{FF2B5EF4-FFF2-40B4-BE49-F238E27FC236}">
-                <a16:creationId xmlns:a16="http://schemas.microsoft.com/office/drawing/2014/main" id="{AD9AC77E-7B01-C28A-FF10-3C5BCDCA6670}"/>
-              </a:ext>
-            </a:extLst>
-          </p:cNvPr>
-          <p:cNvSpPr txBox="1"/>
-          <p:nvPr/>
-        </p:nvSpPr>
-        <p:spPr>
-          <a:xfrm>
-            <a:off x="6096000" y="1090523"/>
-            <a:ext cx="5879690" cy="1200329"/>
-          </a:xfrm>
-          <a:prstGeom prst="rect">
-            <a:avLst/>
-          </a:prstGeom>
-          <a:noFill/>
-        </p:spPr>
-        <p:txBody>
           <a:bodyPr wrap="square" rtlCol="0">
             <a:spAutoFit/>
           </a:bodyPr>
@@ -4671,7 +4612,7 @@
             </a:r>
             <a:r>
               <a:rPr lang="en-US"/>
-              <a:t>, nét vẽ 2, bút vẽ màu xanh như Hình số 2.</a:t>
+              <a:t>, nét vẽ 2, bút vẽ màu đỏ như Hình số 2.</a:t>
             </a:r>
           </a:p>
           <a:p>

</xml_diff>